<commit_message>
Adding References to the powerpointnt
</commit_message>
<xml_diff>
--- a/PowerPoint Presentation/Sentiment Analysis of Movie Reviews.pptx
+++ b/PowerPoint Presentation/Sentiment Analysis of Movie Reviews.pptx
@@ -23,6 +23,7 @@
     <p:sldId id="302" r:id="rId17"/>
     <p:sldId id="303" r:id="rId18"/>
     <p:sldId id="306" r:id="rId19"/>
+    <p:sldId id="307" r:id="rId20"/>
   </p:sldIdLst>
   <p:sldSz cx="12192000" cy="6858000"/>
   <p:notesSz cx="6858000" cy="9144000"/>
@@ -10493,6 +10494,527 @@
     <p:extLst>
       <p:ext uri="{BB962C8B-B14F-4D97-AF65-F5344CB8AC3E}">
         <p14:creationId xmlns:p14="http://schemas.microsoft.com/office/powerpoint/2010/main" val="898200407"/>
+      </p:ext>
+    </p:extLst>
+  </p:cSld>
+  <p:clrMapOvr>
+    <a:masterClrMapping/>
+  </p:clrMapOvr>
+</p:sld>
+</file>
+
+<file path=ppt/slides/slide19.xml><?xml version="1.0" encoding="utf-8"?>
+<p:sld xmlns:a="http://schemas.openxmlformats.org/drawingml/2006/main" xmlns:r="http://schemas.openxmlformats.org/officeDocument/2006/relationships" xmlns:p="http://schemas.openxmlformats.org/presentationml/2006/main">
+  <p:cSld>
+    <p:bg>
+      <p:bgPr>
+        <a:solidFill>
+          <a:schemeClr val="bg1"/>
+        </a:solidFill>
+        <a:effectLst/>
+      </p:bgPr>
+    </p:bg>
+    <p:spTree>
+      <p:nvGrpSpPr>
+        <p:cNvPr id="1" name=""/>
+        <p:cNvGrpSpPr/>
+        <p:nvPr/>
+      </p:nvGrpSpPr>
+      <p:grpSpPr>
+        <a:xfrm>
+          <a:off x="0" y="0"/>
+          <a:ext cx="0" cy="0"/>
+          <a:chOff x="0" y="0"/>
+          <a:chExt cx="0" cy="0"/>
+        </a:xfrm>
+      </p:grpSpPr>
+      <p:sp useBgFill="1">
+        <p:nvSpPr>
+          <p:cNvPr id="8" name="Rectangle 7">
+            <a:extLst>
+              <a:ext uri="{FF2B5EF4-FFF2-40B4-BE49-F238E27FC236}">
+                <a16:creationId xmlns:a16="http://schemas.microsoft.com/office/drawing/2014/main" id="{1B15ED52-F352-441B-82BF-E0EA34836D08}"/>
+              </a:ext>
+              <a:ext uri="{C183D7F6-B498-43B3-948B-1728B52AA6E4}">
+                <adec:decorative xmlns:adec="http://schemas.microsoft.com/office/drawing/2017/decorative" val="1"/>
+              </a:ext>
+            </a:extLst>
+          </p:cNvPr>
+          <p:cNvSpPr>
+            <a:spLocks noGrp="1" noRot="1" noChangeAspect="1" noMove="1" noResize="1" noEditPoints="1" noAdjustHandles="1" noChangeArrowheads="1" noChangeShapeType="1" noTextEdit="1"/>
+          </p:cNvSpPr>
+          <p:nvPr>
+            <p:extLst>
+              <p:ext uri="{386F3935-93C4-4BCD-93E2-E3B085C9AB24}">
+                <p16:designElem xmlns:p16="http://schemas.microsoft.com/office/powerpoint/2015/main" val="1"/>
+              </p:ext>
+            </p:extLst>
+          </p:nvPr>
+        </p:nvSpPr>
+        <p:spPr>
+          <a:xfrm>
+            <a:off x="0" y="0"/>
+            <a:ext cx="12192000" cy="6858000"/>
+          </a:xfrm>
+          <a:prstGeom prst="rect">
+            <a:avLst/>
+          </a:prstGeom>
+          <a:ln w="12700" cap="flat" cmpd="sng" algn="ctr">
+            <a:noFill/>
+            <a:prstDash val="solid"/>
+            <a:miter lim="800000"/>
+          </a:ln>
+          <a:effectLst/>
+          <a:extLst>
+            <a:ext uri="{91240B29-F687-4F45-9708-019B960494DF}">
+              <a14:hiddenLine xmlns:a14="http://schemas.microsoft.com/office/drawing/2010/main" w="12700" cap="flat" cmpd="sng" algn="ctr">
+                <a:solidFill>
+                  <a:schemeClr val="accent1">
+                    <a:shade val="50000"/>
+                  </a:schemeClr>
+                </a:solidFill>
+                <a:prstDash val="solid"/>
+                <a:miter lim="800000"/>
+              </a14:hiddenLine>
+            </a:ext>
+          </a:extLst>
+        </p:spPr>
+        <p:style>
+          <a:lnRef idx="2">
+            <a:schemeClr val="accent1">
+              <a:shade val="50000"/>
+            </a:schemeClr>
+          </a:lnRef>
+          <a:fillRef idx="1">
+            <a:schemeClr val="accent1"/>
+          </a:fillRef>
+          <a:effectRef idx="0">
+            <a:schemeClr val="accent1"/>
+          </a:effectRef>
+          <a:fontRef idx="minor">
+            <a:schemeClr val="lt1"/>
+          </a:fontRef>
+        </p:style>
+        <p:txBody>
+          <a:bodyPr rtlCol="0" anchor="ctr"/>
+          <a:lstStyle/>
+          <a:p>
+            <a:pPr algn="ctr"/>
+            <a:endParaRPr lang="en-US"/>
+          </a:p>
+        </p:txBody>
+      </p:sp>
+      <p:sp>
+        <p:nvSpPr>
+          <p:cNvPr id="10" name="Rectangle 9">
+            <a:extLst>
+              <a:ext uri="{FF2B5EF4-FFF2-40B4-BE49-F238E27FC236}">
+                <a16:creationId xmlns:a16="http://schemas.microsoft.com/office/drawing/2014/main" id="{3B2E3793-BFE6-45A2-9B7B-E18844431C99}"/>
+              </a:ext>
+              <a:ext uri="{C183D7F6-B498-43B3-948B-1728B52AA6E4}">
+                <adec:decorative xmlns:adec="http://schemas.microsoft.com/office/drawing/2017/decorative" val="1"/>
+              </a:ext>
+            </a:extLst>
+          </p:cNvPr>
+          <p:cNvSpPr>
+            <a:spLocks noGrp="1" noRot="1" noChangeAspect="1" noMove="1" noResize="1" noEditPoints="1" noAdjustHandles="1" noChangeArrowheads="1" noChangeShapeType="1" noTextEdit="1"/>
+          </p:cNvSpPr>
+          <p:nvPr>
+            <p:extLst>
+              <p:ext uri="{386F3935-93C4-4BCD-93E2-E3B085C9AB24}">
+                <p16:designElem xmlns:p16="http://schemas.microsoft.com/office/powerpoint/2015/main" val="1"/>
+              </p:ext>
+            </p:extLst>
+          </p:nvPr>
+        </p:nvSpPr>
+        <p:spPr>
+          <a:xfrm flipH="1">
+            <a:off x="-1" y="-1"/>
+            <a:ext cx="12191998" cy="1590742"/>
+          </a:xfrm>
+          <a:prstGeom prst="rect">
+            <a:avLst/>
+          </a:prstGeom>
+          <a:gradFill>
+            <a:gsLst>
+              <a:gs pos="0">
+                <a:srgbClr val="000000"/>
+              </a:gs>
+              <a:gs pos="100000">
+                <a:schemeClr val="accent1">
+                  <a:lumMod val="75000"/>
+                </a:schemeClr>
+              </a:gs>
+            </a:gsLst>
+            <a:lin ang="8400000" scaled="0"/>
+          </a:gradFill>
+          <a:ln>
+            <a:noFill/>
+          </a:ln>
+        </p:spPr>
+        <p:style>
+          <a:lnRef idx="2">
+            <a:schemeClr val="accent1">
+              <a:shade val="50000"/>
+            </a:schemeClr>
+          </a:lnRef>
+          <a:fillRef idx="1">
+            <a:schemeClr val="accent1"/>
+          </a:fillRef>
+          <a:effectRef idx="0">
+            <a:schemeClr val="accent1"/>
+          </a:effectRef>
+          <a:fontRef idx="minor">
+            <a:schemeClr val="lt1"/>
+          </a:fontRef>
+        </p:style>
+        <p:txBody>
+          <a:bodyPr rtlCol="0" anchor="ctr"/>
+          <a:lstStyle/>
+          <a:p>
+            <a:pPr algn="ctr"/>
+            <a:endParaRPr lang="en-US"/>
+          </a:p>
+        </p:txBody>
+      </p:sp>
+      <p:sp>
+        <p:nvSpPr>
+          <p:cNvPr id="12" name="Rectangle 11">
+            <a:extLst>
+              <a:ext uri="{FF2B5EF4-FFF2-40B4-BE49-F238E27FC236}">
+                <a16:creationId xmlns:a16="http://schemas.microsoft.com/office/drawing/2014/main" id="{BC4C4868-CB8F-4AF9-9CDB-8108F2C19B67}"/>
+              </a:ext>
+              <a:ext uri="{C183D7F6-B498-43B3-948B-1728B52AA6E4}">
+                <adec:decorative xmlns:adec="http://schemas.microsoft.com/office/drawing/2017/decorative" val="1"/>
+              </a:ext>
+            </a:extLst>
+          </p:cNvPr>
+          <p:cNvSpPr>
+            <a:spLocks noGrp="1" noRot="1" noChangeAspect="1" noMove="1" noResize="1" noEditPoints="1" noAdjustHandles="1" noChangeArrowheads="1" noChangeShapeType="1" noTextEdit="1"/>
+          </p:cNvSpPr>
+          <p:nvPr>
+            <p:extLst>
+              <p:ext uri="{386F3935-93C4-4BCD-93E2-E3B085C9AB24}">
+                <p16:designElem xmlns:p16="http://schemas.microsoft.com/office/powerpoint/2015/main" val="1"/>
+              </p:ext>
+            </p:extLst>
+          </p:nvPr>
+        </p:nvSpPr>
+        <p:spPr>
+          <a:xfrm rot="10800000" flipH="1">
+            <a:off x="-3" y="0"/>
+            <a:ext cx="8115306" cy="1590742"/>
+          </a:xfrm>
+          <a:prstGeom prst="rect">
+            <a:avLst/>
+          </a:prstGeom>
+          <a:gradFill>
+            <a:gsLst>
+              <a:gs pos="20000">
+                <a:schemeClr val="accent1">
+                  <a:alpha val="0"/>
+                </a:schemeClr>
+              </a:gs>
+              <a:gs pos="100000">
+                <a:schemeClr val="accent1">
+                  <a:lumMod val="50000"/>
+                  <a:alpha val="55000"/>
+                </a:schemeClr>
+              </a:gs>
+            </a:gsLst>
+            <a:lin ang="13800000" scaled="0"/>
+          </a:gradFill>
+          <a:ln>
+            <a:noFill/>
+          </a:ln>
+        </p:spPr>
+        <p:style>
+          <a:lnRef idx="2">
+            <a:schemeClr val="accent1">
+              <a:shade val="50000"/>
+            </a:schemeClr>
+          </a:lnRef>
+          <a:fillRef idx="1">
+            <a:schemeClr val="accent1"/>
+          </a:fillRef>
+          <a:effectRef idx="0">
+            <a:schemeClr val="accent1"/>
+          </a:effectRef>
+          <a:fontRef idx="minor">
+            <a:schemeClr val="lt1"/>
+          </a:fontRef>
+        </p:style>
+        <p:txBody>
+          <a:bodyPr rtlCol="0" anchor="ctr"/>
+          <a:lstStyle/>
+          <a:p>
+            <a:pPr algn="ctr"/>
+            <a:endParaRPr lang="en-US"/>
+          </a:p>
+        </p:txBody>
+      </p:sp>
+      <p:sp>
+        <p:nvSpPr>
+          <p:cNvPr id="14" name="Rectangle 13">
+            <a:extLst>
+              <a:ext uri="{FF2B5EF4-FFF2-40B4-BE49-F238E27FC236}">
+                <a16:creationId xmlns:a16="http://schemas.microsoft.com/office/drawing/2014/main" id="{375E0459-6403-40CD-989D-56A4407CA12E}"/>
+              </a:ext>
+              <a:ext uri="{C183D7F6-B498-43B3-948B-1728B52AA6E4}">
+                <adec:decorative xmlns:adec="http://schemas.microsoft.com/office/drawing/2017/decorative" val="1"/>
+              </a:ext>
+            </a:extLst>
+          </p:cNvPr>
+          <p:cNvSpPr>
+            <a:spLocks noGrp="1" noRot="1" noChangeAspect="1" noMove="1" noResize="1" noEditPoints="1" noAdjustHandles="1" noChangeArrowheads="1" noChangeShapeType="1" noTextEdit="1"/>
+          </p:cNvSpPr>
+          <p:nvPr>
+            <p:extLst>
+              <p:ext uri="{386F3935-93C4-4BCD-93E2-E3B085C9AB24}">
+                <p16:designElem xmlns:p16="http://schemas.microsoft.com/office/powerpoint/2015/main" val="1"/>
+              </p:ext>
+            </p:extLst>
+          </p:nvPr>
+        </p:nvSpPr>
+        <p:spPr>
+          <a:xfrm flipH="1">
+            <a:off x="8115299" y="-1"/>
+            <a:ext cx="4076698" cy="1590742"/>
+          </a:xfrm>
+          <a:prstGeom prst="rect">
+            <a:avLst/>
+          </a:prstGeom>
+          <a:gradFill>
+            <a:gsLst>
+              <a:gs pos="0">
+                <a:schemeClr val="accent1">
+                  <a:alpha val="66000"/>
+                </a:schemeClr>
+              </a:gs>
+              <a:gs pos="100000">
+                <a:srgbClr val="000000">
+                  <a:alpha val="30000"/>
+                </a:srgbClr>
+              </a:gs>
+            </a:gsLst>
+            <a:lin ang="13200000" scaled="0"/>
+          </a:gradFill>
+          <a:ln>
+            <a:noFill/>
+          </a:ln>
+        </p:spPr>
+        <p:style>
+          <a:lnRef idx="2">
+            <a:schemeClr val="accent1">
+              <a:shade val="50000"/>
+            </a:schemeClr>
+          </a:lnRef>
+          <a:fillRef idx="1">
+            <a:schemeClr val="accent1"/>
+          </a:fillRef>
+          <a:effectRef idx="0">
+            <a:schemeClr val="accent1"/>
+          </a:effectRef>
+          <a:fontRef idx="minor">
+            <a:schemeClr val="lt1"/>
+          </a:fontRef>
+        </p:style>
+        <p:txBody>
+          <a:bodyPr rtlCol="0" anchor="ctr"/>
+          <a:lstStyle/>
+          <a:p>
+            <a:pPr algn="ctr"/>
+            <a:endParaRPr lang="en-US"/>
+          </a:p>
+        </p:txBody>
+      </p:sp>
+      <p:sp>
+        <p:nvSpPr>
+          <p:cNvPr id="16" name="Rectangle 15">
+            <a:extLst>
+              <a:ext uri="{FF2B5EF4-FFF2-40B4-BE49-F238E27FC236}">
+                <a16:creationId xmlns:a16="http://schemas.microsoft.com/office/drawing/2014/main" id="{53E5B1A8-3AC9-4BD1-9BBC-78CA94F2D1BA}"/>
+              </a:ext>
+              <a:ext uri="{C183D7F6-B498-43B3-948B-1728B52AA6E4}">
+                <adec:decorative xmlns:adec="http://schemas.microsoft.com/office/drawing/2017/decorative" val="1"/>
+              </a:ext>
+            </a:extLst>
+          </p:cNvPr>
+          <p:cNvSpPr>
+            <a:spLocks noGrp="1" noRot="1" noChangeAspect="1" noMove="1" noResize="1" noEditPoints="1" noAdjustHandles="1" noChangeArrowheads="1" noChangeShapeType="1" noTextEdit="1"/>
+          </p:cNvSpPr>
+          <p:nvPr>
+            <p:extLst>
+              <p:ext uri="{386F3935-93C4-4BCD-93E2-E3B085C9AB24}">
+                <p16:designElem xmlns:p16="http://schemas.microsoft.com/office/powerpoint/2015/main" val="1"/>
+              </p:ext>
+            </p:extLst>
+          </p:nvPr>
+        </p:nvSpPr>
+        <p:spPr>
+          <a:xfrm>
+            <a:off x="459350" y="-1"/>
+            <a:ext cx="11732646" cy="1597433"/>
+          </a:xfrm>
+          <a:prstGeom prst="rect">
+            <a:avLst/>
+          </a:prstGeom>
+          <a:gradFill>
+            <a:gsLst>
+              <a:gs pos="50000">
+                <a:srgbClr val="000000">
+                  <a:alpha val="0"/>
+                </a:srgbClr>
+              </a:gs>
+              <a:gs pos="99000">
+                <a:schemeClr val="accent1">
+                  <a:lumMod val="50000"/>
+                  <a:alpha val="52000"/>
+                </a:schemeClr>
+              </a:gs>
+            </a:gsLst>
+            <a:lin ang="16800000" scaled="0"/>
+          </a:gradFill>
+          <a:ln>
+            <a:noFill/>
+          </a:ln>
+        </p:spPr>
+        <p:style>
+          <a:lnRef idx="2">
+            <a:schemeClr val="accent1">
+              <a:shade val="50000"/>
+            </a:schemeClr>
+          </a:lnRef>
+          <a:fillRef idx="1">
+            <a:schemeClr val="accent1"/>
+          </a:fillRef>
+          <a:effectRef idx="0">
+            <a:schemeClr val="accent1"/>
+          </a:effectRef>
+          <a:fontRef idx="minor">
+            <a:schemeClr val="lt1"/>
+          </a:fontRef>
+        </p:style>
+        <p:txBody>
+          <a:bodyPr rtlCol="0" anchor="ctr"/>
+          <a:lstStyle/>
+          <a:p>
+            <a:pPr algn="ctr"/>
+            <a:endParaRPr lang="en-US"/>
+          </a:p>
+        </p:txBody>
+      </p:sp>
+      <p:sp>
+        <p:nvSpPr>
+          <p:cNvPr id="2" name="Title 1">
+            <a:extLst>
+              <a:ext uri="{FF2B5EF4-FFF2-40B4-BE49-F238E27FC236}">
+                <a16:creationId xmlns:a16="http://schemas.microsoft.com/office/drawing/2014/main" id="{E0FA7837-DDC9-4FE1-9B7D-4C2E43F8EF8D}"/>
+              </a:ext>
+            </a:extLst>
+          </p:cNvPr>
+          <p:cNvSpPr>
+            <a:spLocks noGrp="1"/>
+          </p:cNvSpPr>
+          <p:nvPr>
+            <p:ph type="title"/>
+          </p:nvPr>
+        </p:nvSpPr>
+        <p:spPr>
+          <a:xfrm>
+            <a:off x="1371599" y="294538"/>
+            <a:ext cx="9895951" cy="1033669"/>
+          </a:xfrm>
+        </p:spPr>
+        <p:txBody>
+          <a:bodyPr>
+            <a:normAutofit/>
+          </a:bodyPr>
+          <a:lstStyle/>
+          <a:p>
+            <a:r>
+              <a:rPr lang="en-US" sz="4000">
+                <a:solidFill>
+                  <a:srgbClr val="FFFFFF"/>
+                </a:solidFill>
+              </a:rPr>
+              <a:t>References</a:t>
+            </a:r>
+          </a:p>
+        </p:txBody>
+      </p:sp>
+      <p:sp>
+        <p:nvSpPr>
+          <p:cNvPr id="3" name="Content Placeholder 2">
+            <a:extLst>
+              <a:ext uri="{FF2B5EF4-FFF2-40B4-BE49-F238E27FC236}">
+                <a16:creationId xmlns:a16="http://schemas.microsoft.com/office/drawing/2014/main" id="{BBD633E9-DBC5-47EF-9EB7-F5A2009B904F}"/>
+              </a:ext>
+            </a:extLst>
+          </p:cNvPr>
+          <p:cNvSpPr>
+            <a:spLocks noGrp="1"/>
+          </p:cNvSpPr>
+          <p:nvPr>
+            <p:ph idx="1"/>
+          </p:nvPr>
+        </p:nvSpPr>
+        <p:spPr>
+          <a:xfrm>
+            <a:off x="1371599" y="2318197"/>
+            <a:ext cx="9724031" cy="3683358"/>
+          </a:xfrm>
+        </p:spPr>
+        <p:txBody>
+          <a:bodyPr anchor="ctr">
+            <a:normAutofit/>
+          </a:bodyPr>
+          <a:lstStyle/>
+          <a:p>
+            <a:r>
+              <a:rPr lang="en-US" sz="2000" b="0" i="0">
+                <a:effectLst/>
+                <a:latin typeface="Source Sans Pro" panose="020B0503030403020204" pitchFamily="34" charset="0"/>
+              </a:rPr>
+              <a:t>Lakshmi Devi B., Varaswathi Bai V., Ramasubbareddy S., Govinda K. (2020) Sentiment Analysis on Movie Reviews. In: Venkata Krishna P., Obaidat M. (eds) Emerging Research in Data Engineering Systems and Computer Communications. Advances in Intelligent Systems and Computing, vol 1054. Springer, Singapore. </a:t>
+            </a:r>
+            <a:r>
+              <a:rPr lang="en-US" sz="2000" b="0" i="0">
+                <a:effectLst/>
+                <a:latin typeface="Source Sans Pro" panose="020B0503030403020204" pitchFamily="34" charset="0"/>
+                <a:hlinkClick r:id="rId2"/>
+              </a:rPr>
+              <a:t>https://doi.org/10.1007/978-981-15-0135-7_31</a:t>
+            </a:r>
+            <a:endParaRPr lang="en-US" sz="2000" b="0" i="0">
+              <a:effectLst/>
+              <a:latin typeface="Source Sans Pro" panose="020B0503030403020204" pitchFamily="34" charset="0"/>
+            </a:endParaRPr>
+          </a:p>
+          <a:p>
+            <a:r>
+              <a:rPr lang="en-US" sz="2000"/>
+              <a:t>“</a:t>
+            </a:r>
+            <a:r>
+              <a:rPr lang="en-US" sz="2000" dirty="0"/>
+              <a:t>Sentiment Analysis with Machine Learning: Process &amp;amp; Tutorial.” </a:t>
+            </a:r>
+            <a:r>
+              <a:rPr lang="en-US" sz="2000"/>
+              <a:t>MonkeyLearn</a:t>
+            </a:r>
+            <a:r>
+              <a:rPr lang="en-US" sz="2000" dirty="0"/>
+              <a:t> Blog, 20 Apr. 2020, monkeylearn.com/blog/sentiment-analysis-machine-learning/. </a:t>
+            </a:r>
+          </a:p>
+        </p:txBody>
+      </p:sp>
+    </p:spTree>
+    <p:extLst>
+      <p:ext uri="{BB962C8B-B14F-4D97-AF65-F5344CB8AC3E}">
+        <p14:creationId xmlns:p14="http://schemas.microsoft.com/office/powerpoint/2010/main" val="1343237114"/>
       </p:ext>
     </p:extLst>
   </p:cSld>

</xml_diff>